<commit_message>
add doc folder and structure ppt
</commit_message>
<xml_diff>
--- a/@Test/_structure/Data Structure and UML Diagram of QuantPy.pptx
+++ b/@Test/_structure/Data Structure and UML Diagram of QuantPy.pptx
@@ -5,17 +5,16 @@
     <p:sldMasterId id="2147483684" r:id="rId1"/>
   </p:sldMasterIdLst>
   <p:notesMasterIdLst>
-    <p:notesMasterId r:id="rId10"/>
+    <p:notesMasterId r:id="rId9"/>
   </p:notesMasterIdLst>
   <p:sldIdLst>
     <p:sldId id="256" r:id="rId2"/>
     <p:sldId id="262" r:id="rId3"/>
     <p:sldId id="265" r:id="rId4"/>
-    <p:sldId id="268" r:id="rId5"/>
-    <p:sldId id="263" r:id="rId6"/>
-    <p:sldId id="266" r:id="rId7"/>
-    <p:sldId id="264" r:id="rId8"/>
-    <p:sldId id="267" r:id="rId9"/>
+    <p:sldId id="263" r:id="rId5"/>
+    <p:sldId id="266" r:id="rId6"/>
+    <p:sldId id="264" r:id="rId7"/>
+    <p:sldId id="267" r:id="rId8"/>
   </p:sldIdLst>
   <p:sldSz cx="12239625" cy="7920038"/>
   <p:notesSz cx="6858000" cy="9144000"/>
@@ -133,6 +132,65 @@
 </p:presentation>
 </file>
 
+<file path=ppt/revisionInfo.xml><?xml version="1.0" encoding="utf-8"?>
+<p1510:revInfo xmlns:a="http://schemas.openxmlformats.org/drawingml/2006/main" xmlns:r="http://schemas.openxmlformats.org/officeDocument/2006/relationships" xmlns:p1510="http://schemas.microsoft.com/office/powerpoint/2015/10/main">
+  <p1510:revLst>
+    <p1510:client id="{1C3FB1A2-3D25-432B-88CD-142BCF747D88}" v="5" dt="2022-02-22T15:27:26.531"/>
+  </p1510:revLst>
+</p1510:revInfo>
+</file>
+
+<file path=ppt/changesInfos/changesInfo1.xml><?xml version="1.0" encoding="utf-8"?>
+<pc:chgInfo xmlns:a="http://schemas.openxmlformats.org/drawingml/2006/main" xmlns:r="http://schemas.openxmlformats.org/officeDocument/2006/relationships" xmlns:ac="http://schemas.microsoft.com/office/drawing/2013/main/command" xmlns:pc="http://schemas.microsoft.com/office/powerpoint/2013/main/command">
+  <pc:docChgLst>
+    <pc:chgData name="Guo, Charles" userId="b1956738-71da-496c-9764-afe27944dc86" providerId="ADAL" clId="{1C3FB1A2-3D25-432B-88CD-142BCF747D88}"/>
+    <pc:docChg chg="custSel delSld modSld">
+      <pc:chgData name="Guo, Charles" userId="b1956738-71da-496c-9764-afe27944dc86" providerId="ADAL" clId="{1C3FB1A2-3D25-432B-88CD-142BCF747D88}" dt="2022-02-22T15:27:49.779" v="47" actId="20577"/>
+      <pc:docMkLst>
+        <pc:docMk/>
+      </pc:docMkLst>
+      <pc:sldChg chg="modSp mod">
+        <pc:chgData name="Guo, Charles" userId="b1956738-71da-496c-9764-afe27944dc86" providerId="ADAL" clId="{1C3FB1A2-3D25-432B-88CD-142BCF747D88}" dt="2022-02-22T15:27:49.779" v="47" actId="20577"/>
+        <pc:sldMkLst>
+          <pc:docMk/>
+          <pc:sldMk cId="1506985498" sldId="256"/>
+        </pc:sldMkLst>
+        <pc:spChg chg="mod">
+          <ac:chgData name="Guo, Charles" userId="b1956738-71da-496c-9764-afe27944dc86" providerId="ADAL" clId="{1C3FB1A2-3D25-432B-88CD-142BCF747D88}" dt="2022-02-22T15:27:49.779" v="47" actId="20577"/>
+          <ac:spMkLst>
+            <pc:docMk/>
+            <pc:sldMk cId="1506985498" sldId="256"/>
+            <ac:spMk id="3" creationId="{B6594272-C452-428D-B0CC-ECEC06B654BE}"/>
+          </ac:spMkLst>
+        </pc:spChg>
+      </pc:sldChg>
+      <pc:sldChg chg="modSp mod">
+        <pc:chgData name="Guo, Charles" userId="b1956738-71da-496c-9764-afe27944dc86" providerId="ADAL" clId="{1C3FB1A2-3D25-432B-88CD-142BCF747D88}" dt="2022-02-22T15:27:03.020" v="10" actId="20577"/>
+        <pc:sldMkLst>
+          <pc:docMk/>
+          <pc:sldMk cId="3423985256" sldId="264"/>
+        </pc:sldMkLst>
+        <pc:spChg chg="mod">
+          <ac:chgData name="Guo, Charles" userId="b1956738-71da-496c-9764-afe27944dc86" providerId="ADAL" clId="{1C3FB1A2-3D25-432B-88CD-142BCF747D88}" dt="2022-02-22T15:27:03.020" v="10" actId="20577"/>
+          <ac:spMkLst>
+            <pc:docMk/>
+            <pc:sldMk cId="3423985256" sldId="264"/>
+            <ac:spMk id="3" creationId="{0A76FAF2-A6B6-4CA1-B845-CB5CDC7D2FB6}"/>
+          </ac:spMkLst>
+        </pc:spChg>
+      </pc:sldChg>
+      <pc:sldChg chg="del">
+        <pc:chgData name="Guo, Charles" userId="b1956738-71da-496c-9764-afe27944dc86" providerId="ADAL" clId="{1C3FB1A2-3D25-432B-88CD-142BCF747D88}" dt="2022-02-22T15:26:31.444" v="0" actId="47"/>
+        <pc:sldMkLst>
+          <pc:docMk/>
+          <pc:sldMk cId="1711966303" sldId="268"/>
+        </pc:sldMkLst>
+      </pc:sldChg>
+    </pc:docChg>
+  </pc:docChgLst>
+</pc:chgInfo>
+</file>
+
 <file path=ppt/notesMasters/notesMaster1.xml><?xml version="1.0" encoding="utf-8"?>
 <p:notesMaster xmlns:a="http://schemas.openxmlformats.org/drawingml/2006/main" xmlns:r="http://schemas.openxmlformats.org/officeDocument/2006/relationships" xmlns:p="http://schemas.openxmlformats.org/presentationml/2006/main">
   <p:cSld>
@@ -215,7 +273,7 @@
           <a:p>
             <a:fld id="{056539EE-56A0-4490-B02B-36C3AF8F0608}" type="datetimeFigureOut">
               <a:rPr lang="zh-Hans-HK" altLang="en-US" smtClean="0"/>
-              <a:t>22/12/2020</a:t>
+              <a:t>02/22/2022</a:t>
             </a:fld>
             <a:endParaRPr lang="zh-Hans-HK" altLang="en-US"/>
           </a:p>
@@ -829,7 +887,7 @@
           <a:p>
             <a:fld id="{251ED145-B0BC-4448-B378-88A8340C3E58}" type="slidenum">
               <a:rPr lang="zh-Hans-HK" altLang="en-US" smtClean="0"/>
-              <a:t>5</a:t>
+              <a:t>4</a:t>
             </a:fld>
             <a:endParaRPr lang="zh-Hans-HK" altLang="en-US"/>
           </a:p>
@@ -979,7 +1037,7 @@
           <a:p>
             <a:fld id="{C88486A0-91B1-42F4-AA0D-0D56FAEE0A7C}" type="datetimeFigureOut">
               <a:rPr lang="zh-Hans-HK" altLang="en-US" smtClean="0"/>
-              <a:t>22/12/2020</a:t>
+              <a:t>02/22/2022</a:t>
             </a:fld>
             <a:endParaRPr lang="zh-Hans-HK" altLang="en-US"/>
           </a:p>
@@ -1149,7 +1207,7 @@
           <a:p>
             <a:fld id="{C88486A0-91B1-42F4-AA0D-0D56FAEE0A7C}" type="datetimeFigureOut">
               <a:rPr lang="zh-Hans-HK" altLang="en-US" smtClean="0"/>
-              <a:t>22/12/2020</a:t>
+              <a:t>02/22/2022</a:t>
             </a:fld>
             <a:endParaRPr lang="zh-Hans-HK" altLang="en-US"/>
           </a:p>
@@ -1329,7 +1387,7 @@
           <a:p>
             <a:fld id="{C88486A0-91B1-42F4-AA0D-0D56FAEE0A7C}" type="datetimeFigureOut">
               <a:rPr lang="zh-Hans-HK" altLang="en-US" smtClean="0"/>
-              <a:t>22/12/2020</a:t>
+              <a:t>02/22/2022</a:t>
             </a:fld>
             <a:endParaRPr lang="zh-Hans-HK" altLang="en-US"/>
           </a:p>
@@ -1499,7 +1557,7 @@
           <a:p>
             <a:fld id="{C88486A0-91B1-42F4-AA0D-0D56FAEE0A7C}" type="datetimeFigureOut">
               <a:rPr lang="zh-Hans-HK" altLang="en-US" smtClean="0"/>
-              <a:t>22/12/2020</a:t>
+              <a:t>02/22/2022</a:t>
             </a:fld>
             <a:endParaRPr lang="zh-Hans-HK" altLang="en-US"/>
           </a:p>
@@ -1743,7 +1801,7 @@
           <a:p>
             <a:fld id="{C88486A0-91B1-42F4-AA0D-0D56FAEE0A7C}" type="datetimeFigureOut">
               <a:rPr lang="zh-Hans-HK" altLang="en-US" smtClean="0"/>
-              <a:t>22/12/2020</a:t>
+              <a:t>02/22/2022</a:t>
             </a:fld>
             <a:endParaRPr lang="zh-Hans-HK" altLang="en-US"/>
           </a:p>
@@ -1975,7 +2033,7 @@
           <a:p>
             <a:fld id="{C88486A0-91B1-42F4-AA0D-0D56FAEE0A7C}" type="datetimeFigureOut">
               <a:rPr lang="zh-Hans-HK" altLang="en-US" smtClean="0"/>
-              <a:t>22/12/2020</a:t>
+              <a:t>02/22/2022</a:t>
             </a:fld>
             <a:endParaRPr lang="zh-Hans-HK" altLang="en-US"/>
           </a:p>
@@ -2342,7 +2400,7 @@
           <a:p>
             <a:fld id="{C88486A0-91B1-42F4-AA0D-0D56FAEE0A7C}" type="datetimeFigureOut">
               <a:rPr lang="zh-Hans-HK" altLang="en-US" smtClean="0"/>
-              <a:t>22/12/2020</a:t>
+              <a:t>02/22/2022</a:t>
             </a:fld>
             <a:endParaRPr lang="zh-Hans-HK" altLang="en-US"/>
           </a:p>
@@ -2460,7 +2518,7 @@
           <a:p>
             <a:fld id="{C88486A0-91B1-42F4-AA0D-0D56FAEE0A7C}" type="datetimeFigureOut">
               <a:rPr lang="zh-Hans-HK" altLang="en-US" smtClean="0"/>
-              <a:t>22/12/2020</a:t>
+              <a:t>02/22/2022</a:t>
             </a:fld>
             <a:endParaRPr lang="zh-Hans-HK" altLang="en-US"/>
           </a:p>
@@ -2555,7 +2613,7 @@
           <a:p>
             <a:fld id="{C88486A0-91B1-42F4-AA0D-0D56FAEE0A7C}" type="datetimeFigureOut">
               <a:rPr lang="zh-Hans-HK" altLang="en-US" smtClean="0"/>
-              <a:t>22/12/2020</a:t>
+              <a:t>02/22/2022</a:t>
             </a:fld>
             <a:endParaRPr lang="zh-Hans-HK" altLang="en-US"/>
           </a:p>
@@ -2832,7 +2890,7 @@
           <a:p>
             <a:fld id="{C88486A0-91B1-42F4-AA0D-0D56FAEE0A7C}" type="datetimeFigureOut">
               <a:rPr lang="zh-Hans-HK" altLang="en-US" smtClean="0"/>
-              <a:t>22/12/2020</a:t>
+              <a:t>02/22/2022</a:t>
             </a:fld>
             <a:endParaRPr lang="zh-Hans-HK" altLang="en-US"/>
           </a:p>
@@ -3089,7 +3147,7 @@
           <a:p>
             <a:fld id="{C88486A0-91B1-42F4-AA0D-0D56FAEE0A7C}" type="datetimeFigureOut">
               <a:rPr lang="zh-Hans-HK" altLang="en-US" smtClean="0"/>
-              <a:t>22/12/2020</a:t>
+              <a:t>02/22/2022</a:t>
             </a:fld>
             <a:endParaRPr lang="zh-Hans-HK" altLang="en-US"/>
           </a:p>
@@ -3302,7 +3360,7 @@
           <a:p>
             <a:fld id="{C88486A0-91B1-42F4-AA0D-0D56FAEE0A7C}" type="datetimeFigureOut">
               <a:rPr lang="zh-Hans-HK" altLang="en-US" smtClean="0"/>
-              <a:t>22/12/2020</a:t>
+              <a:t>02/22/2022</a:t>
             </a:fld>
             <a:endParaRPr lang="zh-Hans-HK" altLang="en-US"/>
           </a:p>
@@ -3775,7 +3833,7 @@
         <p:spPr/>
         <p:txBody>
           <a:bodyPr>
-            <a:normAutofit lnSpcReduction="10000"/>
+            <a:normAutofit fontScale="92500" lnSpcReduction="20000"/>
           </a:bodyPr>
           <a:lstStyle/>
           <a:p>
@@ -3797,9 +3855,15 @@
             </a:br>
             <a:r>
               <a:rPr lang="en-US" altLang="zh-Hans-HK" dirty="0"/>
-              <a:t>2020.12.20 - </a:t>
-            </a:r>
-            <a:endParaRPr lang="zh-Hans-HK" altLang="en-US" dirty="0"/>
+              <a:t>2020.12.20 - ??</a:t>
+            </a:r>
+            <a:br>
+              <a:rPr lang="en-US" altLang="zh-Hans-HK" dirty="0"/>
+            </a:br>
+            <a:r>
+              <a:rPr lang="en-US" altLang="zh-Hans-HK" dirty="0"/>
+              <a:t>2022.02.22 - </a:t>
+            </a:r>
           </a:p>
         </p:txBody>
       </p:sp>
@@ -6882,60 +6946,445 @@
       </p:grpSpPr>
       <p:sp>
         <p:nvSpPr>
-          <p:cNvPr id="4" name="流程图: 过程 3">
+          <p:cNvPr id="2" name="标题 1">
             <a:extLst>
               <a:ext uri="{FF2B5EF4-FFF2-40B4-BE49-F238E27FC236}">
-                <a16:creationId xmlns:a16="http://schemas.microsoft.com/office/drawing/2014/main" id="{A0F0E936-824E-41E8-B013-1051678A03A6}"/>
+                <a16:creationId xmlns:a16="http://schemas.microsoft.com/office/drawing/2014/main" id="{F532A3AA-81D1-4278-BCDE-728827FF64A8}"/>
               </a:ext>
             </a:extLst>
           </p:cNvPr>
-          <p:cNvSpPr/>
+          <p:cNvSpPr>
+            <a:spLocks noGrp="1"/>
+          </p:cNvSpPr>
+          <p:nvPr>
+            <p:ph type="title"/>
+          </p:nvPr>
+        </p:nvSpPr>
+        <p:spPr/>
+        <p:txBody>
+          <a:bodyPr/>
+          <a:lstStyle/>
+          <a:p>
+            <a:r>
+              <a:rPr lang="en-US" altLang="zh-CN" dirty="0"/>
+              <a:t>Data structure</a:t>
+            </a:r>
+            <a:endParaRPr lang="zh-Hans-HK" altLang="en-US" dirty="0"/>
+          </a:p>
+        </p:txBody>
+      </p:sp>
+      <p:sp>
+        <p:nvSpPr>
+          <p:cNvPr id="4" name="文本框 3">
+            <a:extLst>
+              <a:ext uri="{FF2B5EF4-FFF2-40B4-BE49-F238E27FC236}">
+                <a16:creationId xmlns:a16="http://schemas.microsoft.com/office/drawing/2014/main" id="{ADA621A2-CAC8-4C88-9AED-8766A9777630}"/>
+              </a:ext>
+            </a:extLst>
+          </p:cNvPr>
+          <p:cNvSpPr txBox="1"/>
           <p:nvPr/>
         </p:nvSpPr>
         <p:spPr>
           <a:xfrm>
-            <a:off x="3174842" y="1329004"/>
-            <a:ext cx="2567135" cy="1550504"/>
+            <a:off x="1139894" y="1971726"/>
+            <a:ext cx="5492932" cy="5803640"/>
           </a:xfrm>
-          <a:prstGeom prst="flowChartProcess">
+          <a:prstGeom prst="rect">
             <a:avLst/>
           </a:prstGeom>
           <a:noFill/>
-          <a:ln>
-            <a:solidFill>
-              <a:schemeClr val="tx1"/>
-            </a:solidFill>
-          </a:ln>
         </p:spPr>
-        <p:style>
-          <a:lnRef idx="2">
-            <a:schemeClr val="accent1">
-              <a:shade val="50000"/>
-            </a:schemeClr>
-          </a:lnRef>
-          <a:fillRef idx="1">
-            <a:schemeClr val="accent1"/>
-          </a:fillRef>
-          <a:effectRef idx="0">
-            <a:schemeClr val="accent1"/>
-          </a:effectRef>
-          <a:fontRef idx="minor">
-            <a:schemeClr val="lt1"/>
-          </a:fontRef>
-        </p:style>
-        <p:txBody>
-          <a:bodyPr rtlCol="0" anchor="ctr"/>
+        <p:txBody>
+          <a:bodyPr wrap="square" rtlCol="0">
+            <a:spAutoFit/>
+          </a:bodyPr>
           <a:lstStyle/>
           <a:p>
-            <a:pPr algn="ctr"/>
-            <a:endParaRPr lang="zh-Hans-HK" altLang="en-US"/>
+            <a:pPr marL="342900" indent="-342900">
+              <a:buFont typeface="Arial" panose="020B0604020202020204" pitchFamily="34" charset="0"/>
+              <a:buChar char="•"/>
+            </a:pPr>
+            <a:r>
+              <a:rPr lang="en-US" altLang="zh-CN" sz="2000" dirty="0"/>
+              <a:t>Trading/</a:t>
+            </a:r>
+            <a:r>
+              <a:rPr lang="en-US" altLang="zh-CN" sz="2000" dirty="0" err="1"/>
+              <a:t>Backtest</a:t>
+            </a:r>
+            <a:r>
+              <a:rPr lang="en-US" altLang="zh-CN" sz="2000" dirty="0"/>
+              <a:t> Platform</a:t>
+            </a:r>
+          </a:p>
+          <a:p>
+            <a:pPr marL="800100" lvl="1" indent="-342900">
+              <a:buFont typeface="Arial" panose="020B0604020202020204" pitchFamily="34" charset="0"/>
+              <a:buChar char="•"/>
+            </a:pPr>
+            <a:r>
+              <a:rPr lang="en-US" altLang="zh-CN" dirty="0"/>
+              <a:t>Class </a:t>
+            </a:r>
+            <a:r>
+              <a:rPr lang="en-US" altLang="zh-CN" dirty="0" err="1"/>
+              <a:t>DataRepository</a:t>
+            </a:r>
+            <a:endParaRPr lang="en-US" altLang="zh-CN" dirty="0"/>
+          </a:p>
+          <a:p>
+            <a:pPr marL="1257300" lvl="2" indent="-342900">
+              <a:buFont typeface="Arial" panose="020B0604020202020204" pitchFamily="34" charset="0"/>
+              <a:buChar char="•"/>
+            </a:pPr>
+            <a:r>
+              <a:rPr lang="en-US" altLang="zh-CN" dirty="0"/>
+              <a:t>List(</a:t>
+            </a:r>
+            <a:r>
+              <a:rPr lang="en-US" altLang="zh-CN" dirty="0" err="1"/>
+              <a:t>kline</a:t>
+            </a:r>
+            <a:r>
+              <a:rPr lang="en-US" altLang="zh-CN" dirty="0"/>
+              <a:t>(</a:t>
+            </a:r>
+            <a:r>
+              <a:rPr lang="en-US" altLang="zh-CN" dirty="0" err="1"/>
+              <a:t>target#i</a:t>
+            </a:r>
+            <a:r>
+              <a:rPr lang="en-US" altLang="zh-CN" dirty="0"/>
+              <a:t>))</a:t>
+            </a:r>
+          </a:p>
+          <a:p>
+            <a:pPr marL="742950" lvl="1" indent="-285750">
+              <a:buFont typeface="Arial" panose="020B0604020202020204" pitchFamily="34" charset="0"/>
+              <a:buChar char="•"/>
+            </a:pPr>
+            <a:r>
+              <a:rPr lang="en-US" altLang="zh-CN" dirty="0"/>
+              <a:t>Class Trade</a:t>
+            </a:r>
+          </a:p>
+          <a:p>
+            <a:pPr marL="1200150" lvl="2" indent="-285750">
+              <a:buFont typeface="Arial" panose="020B0604020202020204" pitchFamily="34" charset="0"/>
+              <a:buChar char="•"/>
+            </a:pPr>
+            <a:r>
+              <a:rPr lang="en-US" altLang="zh-CN" sz="1600" dirty="0"/>
+              <a:t>Buy/Sold</a:t>
+            </a:r>
+          </a:p>
+          <a:p>
+            <a:pPr marL="1200150" lvl="2" indent="-285750">
+              <a:buFont typeface="Arial" panose="020B0604020202020204" pitchFamily="34" charset="0"/>
+              <a:buChar char="•"/>
+            </a:pPr>
+            <a:r>
+              <a:rPr lang="en-US" altLang="zh-CN" sz="1600" dirty="0"/>
+              <a:t>Stop-profit price/Stop limit</a:t>
+            </a:r>
+          </a:p>
+          <a:p>
+            <a:pPr marL="1200150" lvl="2" indent="-285750">
+              <a:buFont typeface="Arial" panose="020B0604020202020204" pitchFamily="34" charset="0"/>
+              <a:buChar char="•"/>
+            </a:pPr>
+            <a:r>
+              <a:rPr lang="en-US" altLang="zh-CN" sz="1600" dirty="0"/>
+              <a:t>Commissions/stamp</a:t>
+            </a:r>
+          </a:p>
+          <a:p>
+            <a:pPr marL="742950" lvl="1" indent="-285750">
+              <a:buFont typeface="Arial" panose="020B0604020202020204" pitchFamily="34" charset="0"/>
+              <a:buChar char="•"/>
+            </a:pPr>
+            <a:r>
+              <a:rPr lang="en-US" altLang="zh-CN" dirty="0"/>
+              <a:t>User Asset</a:t>
+            </a:r>
+          </a:p>
+          <a:p>
+            <a:pPr marL="1200150" lvl="2" indent="-285750">
+              <a:buFont typeface="Arial" panose="020B0604020202020204" pitchFamily="34" charset="0"/>
+              <a:buChar char="•"/>
+            </a:pPr>
+            <a:r>
+              <a:rPr lang="en-US" altLang="zh-CN" sz="1600" dirty="0"/>
+              <a:t>Quantity</a:t>
+            </a:r>
+          </a:p>
+          <a:p>
+            <a:pPr marL="1200150" lvl="2" indent="-285750">
+              <a:buFont typeface="Arial" panose="020B0604020202020204" pitchFamily="34" charset="0"/>
+              <a:buChar char="•"/>
+            </a:pPr>
+            <a:r>
+              <a:rPr lang="en-US" altLang="zh-CN" sz="1600" dirty="0"/>
+              <a:t>Profit</a:t>
+            </a:r>
+          </a:p>
+          <a:p>
+            <a:pPr marL="742950" lvl="1" indent="-285750">
+              <a:buFont typeface="Arial" panose="020B0604020202020204" pitchFamily="34" charset="0"/>
+              <a:buChar char="•"/>
+            </a:pPr>
+            <a:r>
+              <a:rPr lang="en-US" altLang="zh-CN" dirty="0" err="1"/>
+              <a:t>RunSimulation</a:t>
+            </a:r>
+            <a:r>
+              <a:rPr lang="en-US" altLang="zh-CN" dirty="0"/>
+              <a:t>()/</a:t>
+            </a:r>
+            <a:r>
+              <a:rPr lang="en-US" altLang="zh-CN" dirty="0" err="1"/>
+              <a:t>RunRealTime</a:t>
+            </a:r>
+            <a:r>
+              <a:rPr lang="en-US" altLang="zh-CN" dirty="0"/>
+              <a:t>()</a:t>
+            </a:r>
+          </a:p>
+          <a:p>
+            <a:pPr marL="1200150" lvl="2" indent="-285750">
+              <a:buFont typeface="Arial" panose="020B0604020202020204" pitchFamily="34" charset="0"/>
+              <a:buChar char="•"/>
+            </a:pPr>
+            <a:r>
+              <a:rPr lang="en-US" altLang="zh-CN" dirty="0" err="1"/>
+              <a:t>MainLoop</a:t>
+            </a:r>
+            <a:r>
+              <a:rPr lang="en-US" altLang="zh-CN" dirty="0"/>
+              <a:t>(daily)</a:t>
+            </a:r>
+          </a:p>
+          <a:p>
+            <a:pPr marL="1657350" lvl="3" indent="-285750">
+              <a:buFont typeface="Arial" panose="020B0604020202020204" pitchFamily="34" charset="0"/>
+              <a:buChar char="•"/>
+            </a:pPr>
+            <a:r>
+              <a:rPr lang="en-US" altLang="zh-CN" dirty="0" err="1"/>
+              <a:t>TradeLoop</a:t>
+            </a:r>
+            <a:r>
+              <a:rPr lang="en-US" altLang="zh-CN" dirty="0"/>
+              <a:t>(</a:t>
+            </a:r>
+            <a:r>
+              <a:rPr lang="en-US" altLang="zh-CN" dirty="0" err="1"/>
+              <a:t>PerMinute</a:t>
+            </a:r>
+            <a:r>
+              <a:rPr lang="en-US" altLang="zh-CN" dirty="0"/>
+              <a:t>)</a:t>
+            </a:r>
+          </a:p>
+          <a:p>
+            <a:pPr marL="2114550" lvl="4" indent="-285750">
+              <a:buFont typeface="Arial" panose="020B0604020202020204" pitchFamily="34" charset="0"/>
+              <a:buChar char="•"/>
+            </a:pPr>
+            <a:r>
+              <a:rPr lang="en-US" altLang="zh-CN" dirty="0" err="1">
+                <a:highlight>
+                  <a:srgbClr val="FFFF00"/>
+                </a:highlight>
+              </a:rPr>
+              <a:t>GenerateEntryPrice</a:t>
+            </a:r>
+            <a:r>
+              <a:rPr lang="en-US" altLang="zh-CN" dirty="0">
+                <a:highlight>
+                  <a:srgbClr val="FFFF00"/>
+                </a:highlight>
+              </a:rPr>
+              <a:t>(</a:t>
+            </a:r>
+            <a:r>
+              <a:rPr lang="en-US" altLang="zh-CN" dirty="0" err="1">
+                <a:highlight>
+                  <a:srgbClr val="FFFF00"/>
+                </a:highlight>
+              </a:rPr>
+              <a:t>CurData</a:t>
+            </a:r>
+            <a:r>
+              <a:rPr lang="en-US" altLang="zh-CN" dirty="0">
+                <a:highlight>
+                  <a:srgbClr val="FFFF00"/>
+                </a:highlight>
+              </a:rPr>
+              <a:t>, </a:t>
+            </a:r>
+            <a:r>
+              <a:rPr lang="en-US" altLang="zh-CN" dirty="0" err="1">
+                <a:highlight>
+                  <a:srgbClr val="FFFF00"/>
+                </a:highlight>
+              </a:rPr>
+              <a:t>Stra</a:t>
+            </a:r>
+            <a:r>
+              <a:rPr lang="en-US" altLang="zh-CN" dirty="0">
+                <a:highlight>
+                  <a:srgbClr val="FFFF00"/>
+                </a:highlight>
+              </a:rPr>
+              <a:t>)</a:t>
+            </a:r>
+          </a:p>
+          <a:p>
+            <a:pPr marL="2114550" lvl="4" indent="-285750">
+              <a:buFont typeface="Arial" panose="020B0604020202020204" pitchFamily="34" charset="0"/>
+              <a:buChar char="•"/>
+            </a:pPr>
+            <a:r>
+              <a:rPr lang="en-US" altLang="zh-CN" dirty="0" err="1"/>
+              <a:t>NewTrade</a:t>
+            </a:r>
+            <a:r>
+              <a:rPr lang="en-US" altLang="zh-CN" dirty="0"/>
+              <a:t>() if (</a:t>
+            </a:r>
+            <a:r>
+              <a:rPr lang="en-US" altLang="zh-CN" dirty="0" err="1"/>
+              <a:t>EntryPrice</a:t>
+            </a:r>
+            <a:r>
+              <a:rPr lang="en-US" altLang="zh-CN" dirty="0"/>
+              <a:t>)</a:t>
+            </a:r>
+          </a:p>
+          <a:p>
+            <a:pPr marL="2114550" lvl="4" indent="-285750">
+              <a:buFont typeface="Arial" panose="020B0604020202020204" pitchFamily="34" charset="0"/>
+              <a:buChar char="•"/>
+            </a:pPr>
+            <a:r>
+              <a:rPr lang="en-US" altLang="zh-CN" dirty="0" err="1"/>
+              <a:t>CheckAllTrade</a:t>
+            </a:r>
+            <a:r>
+              <a:rPr lang="en-US" altLang="zh-CN" dirty="0"/>
+              <a:t>()</a:t>
+            </a:r>
+          </a:p>
+          <a:p>
+            <a:pPr marL="2571750" lvl="5" indent="-285750">
+              <a:buFont typeface="Arial" panose="020B0604020202020204" pitchFamily="34" charset="0"/>
+              <a:buChar char="•"/>
+            </a:pPr>
+            <a:r>
+              <a:rPr lang="en-US" altLang="zh-CN" dirty="0" err="1">
+                <a:highlight>
+                  <a:srgbClr val="FFFF00"/>
+                </a:highlight>
+              </a:rPr>
+              <a:t>ReNewAllTrade</a:t>
+            </a:r>
+            <a:r>
+              <a:rPr lang="en-US" altLang="zh-CN" dirty="0">
+                <a:highlight>
+                  <a:srgbClr val="FFFF00"/>
+                </a:highlight>
+              </a:rPr>
+              <a:t>(</a:t>
+            </a:r>
+            <a:r>
+              <a:rPr lang="en-US" altLang="zh-CN" dirty="0" err="1">
+                <a:highlight>
+                  <a:srgbClr val="FFFF00"/>
+                </a:highlight>
+              </a:rPr>
+              <a:t>CurData</a:t>
+            </a:r>
+            <a:r>
+              <a:rPr lang="en-US" altLang="zh-CN" dirty="0">
+                <a:highlight>
+                  <a:srgbClr val="FFFF00"/>
+                </a:highlight>
+              </a:rPr>
+              <a:t>, </a:t>
+            </a:r>
+            <a:r>
+              <a:rPr lang="en-US" altLang="zh-CN" dirty="0" err="1">
+                <a:highlight>
+                  <a:srgbClr val="FFFF00"/>
+                </a:highlight>
+              </a:rPr>
+              <a:t>Stra</a:t>
+            </a:r>
+            <a:r>
+              <a:rPr lang="en-US" altLang="zh-CN" dirty="0">
+                <a:highlight>
+                  <a:srgbClr val="FFFF00"/>
+                </a:highlight>
+              </a:rPr>
+              <a:t>)</a:t>
+            </a:r>
+          </a:p>
+          <a:p>
+            <a:pPr marL="2571750" lvl="5" indent="-285750">
+              <a:buFont typeface="Arial" panose="020B0604020202020204" pitchFamily="34" charset="0"/>
+              <a:buChar char="•"/>
+            </a:pPr>
+            <a:r>
+              <a:rPr lang="en-US" altLang="zh-CN" dirty="0" err="1"/>
+              <a:t>CloseTrade</a:t>
+            </a:r>
+            <a:r>
+              <a:rPr lang="en-US" altLang="zh-CN" dirty="0"/>
+              <a:t>() if (Stop touch)</a:t>
+            </a:r>
+          </a:p>
+          <a:p>
+            <a:pPr marL="2114550" lvl="4" indent="-285750">
+              <a:buFont typeface="Arial" panose="020B0604020202020204" pitchFamily="34" charset="0"/>
+              <a:buChar char="•"/>
+            </a:pPr>
+            <a:r>
+              <a:rPr lang="en-US" altLang="zh-CN" dirty="0" err="1"/>
+              <a:t>CalculateUserAsset</a:t>
+            </a:r>
+            <a:r>
+              <a:rPr lang="en-US" altLang="zh-CN" dirty="0"/>
+              <a:t>()</a:t>
+            </a:r>
+          </a:p>
+          <a:p>
+            <a:pPr marL="685800" lvl="1" indent="-228600" defTabSz="914400">
+              <a:lnSpc>
+                <a:spcPct val="90000"/>
+              </a:lnSpc>
+              <a:spcBef>
+                <a:spcPts val="1000"/>
+              </a:spcBef>
+              <a:buFont typeface="Arial" panose="020B0604020202020204" pitchFamily="34" charset="0"/>
+              <a:buChar char="•"/>
+              <a:defRPr/>
+            </a:pPr>
+            <a:endParaRPr lang="en-US" altLang="zh-CN" sz="3200" dirty="0">
+              <a:solidFill>
+                <a:prstClr val="black"/>
+              </a:solidFill>
+              <a:latin typeface="Calibri" panose="020F0502020204030204"/>
+              <a:ea typeface="等线" panose="02010600030101010101" pitchFamily="2" charset="-122"/>
+            </a:endParaRPr>
           </a:p>
         </p:txBody>
       </p:sp>
     </p:spTree>
     <p:extLst>
       <p:ext uri="{BB962C8B-B14F-4D97-AF65-F5344CB8AC3E}">
-        <p14:creationId xmlns:p14="http://schemas.microsoft.com/office/powerpoint/2010/main" val="1711966303"/>
+        <p14:creationId xmlns:p14="http://schemas.microsoft.com/office/powerpoint/2010/main" val="1563037589"/>
       </p:ext>
     </p:extLst>
   </p:cSld>
@@ -6993,10 +7442,10 @@
       </p:sp>
       <p:sp>
         <p:nvSpPr>
-          <p:cNvPr id="4" name="文本框 3">
+          <p:cNvPr id="5" name="文本框 4">
             <a:extLst>
               <a:ext uri="{FF2B5EF4-FFF2-40B4-BE49-F238E27FC236}">
-                <a16:creationId xmlns:a16="http://schemas.microsoft.com/office/drawing/2014/main" id="{ADA621A2-CAC8-4C88-9AED-8766A9777630}"/>
+                <a16:creationId xmlns:a16="http://schemas.microsoft.com/office/drawing/2014/main" id="{3919AAC9-D388-4525-B1AD-BD82755F9FBC}"/>
               </a:ext>
             </a:extLst>
           </p:cNvPr>
@@ -7005,8 +7454,8 @@
         </p:nvSpPr>
         <p:spPr>
           <a:xfrm>
-            <a:off x="1139894" y="1971726"/>
-            <a:ext cx="5492932" cy="5803640"/>
+            <a:off x="7515361" y="2221708"/>
+            <a:ext cx="4881465" cy="3023905"/>
           </a:xfrm>
           <a:prstGeom prst="rect">
             <a:avLst/>
@@ -7014,67 +7463,18 @@
           <a:noFill/>
         </p:spPr>
         <p:txBody>
-          <a:bodyPr wrap="square" rtlCol="0">
+          <a:bodyPr wrap="none" rtlCol="0">
             <a:spAutoFit/>
           </a:bodyPr>
           <a:lstStyle/>
           <a:p>
-            <a:pPr marL="342900" indent="-342900">
+            <a:pPr marL="285750" indent="-285750">
               <a:buFont typeface="Arial" panose="020B0604020202020204" pitchFamily="34" charset="0"/>
               <a:buChar char="•"/>
             </a:pPr>
             <a:r>
-              <a:rPr lang="en-US" altLang="zh-CN" sz="2000" dirty="0"/>
-              <a:t>Trading/</a:t>
-            </a:r>
-            <a:r>
-              <a:rPr lang="en-US" altLang="zh-CN" sz="2000" dirty="0" err="1"/>
-              <a:t>Backtest</a:t>
-            </a:r>
-            <a:r>
-              <a:rPr lang="en-US" altLang="zh-CN" sz="2000" dirty="0"/>
-              <a:t> Platform</a:t>
-            </a:r>
-          </a:p>
-          <a:p>
-            <a:pPr marL="800100" lvl="1" indent="-342900">
-              <a:buFont typeface="Arial" panose="020B0604020202020204" pitchFamily="34" charset="0"/>
-              <a:buChar char="•"/>
-            </a:pPr>
-            <a:r>
-              <a:rPr lang="en-US" altLang="zh-CN" dirty="0"/>
-              <a:t>Class </a:t>
-            </a:r>
-            <a:r>
-              <a:rPr lang="en-US" altLang="zh-CN" dirty="0" err="1"/>
-              <a:t>DataRepository</a:t>
-            </a:r>
-            <a:endParaRPr lang="en-US" altLang="zh-CN" dirty="0"/>
-          </a:p>
-          <a:p>
-            <a:pPr marL="1257300" lvl="2" indent="-342900">
-              <a:buFont typeface="Arial" panose="020B0604020202020204" pitchFamily="34" charset="0"/>
-              <a:buChar char="•"/>
-            </a:pPr>
-            <a:r>
-              <a:rPr lang="en-US" altLang="zh-CN" dirty="0"/>
-              <a:t>List(</a:t>
-            </a:r>
-            <a:r>
-              <a:rPr lang="en-US" altLang="zh-CN" dirty="0" err="1"/>
-              <a:t>kline</a:t>
-            </a:r>
-            <a:r>
-              <a:rPr lang="en-US" altLang="zh-CN" dirty="0"/>
-              <a:t>(</a:t>
-            </a:r>
-            <a:r>
-              <a:rPr lang="en-US" altLang="zh-CN" dirty="0" err="1"/>
-              <a:t>target#i</a:t>
-            </a:r>
-            <a:r>
-              <a:rPr lang="en-US" altLang="zh-CN" dirty="0"/>
-              <a:t>))</a:t>
+              <a:rPr lang="en-US" altLang="zh-Hans-HK" dirty="0"/>
+              <a:t>Strategy(Learning)</a:t>
             </a:r>
           </a:p>
           <a:p>
@@ -7083,130 +7483,12 @@
               <a:buChar char="•"/>
             </a:pPr>
             <a:r>
-              <a:rPr lang="en-US" altLang="zh-CN" dirty="0"/>
-              <a:t>Class Trade</a:t>
+              <a:rPr lang="en-US" altLang="zh-Hans-HK" dirty="0"/>
+              <a:t>Strategy</a:t>
             </a:r>
           </a:p>
           <a:p>
             <a:pPr marL="1200150" lvl="2" indent="-285750">
-              <a:buFont typeface="Arial" panose="020B0604020202020204" pitchFamily="34" charset="0"/>
-              <a:buChar char="•"/>
-            </a:pPr>
-            <a:r>
-              <a:rPr lang="en-US" altLang="zh-CN" sz="1600" dirty="0"/>
-              <a:t>Buy/Sold</a:t>
-            </a:r>
-          </a:p>
-          <a:p>
-            <a:pPr marL="1200150" lvl="2" indent="-285750">
-              <a:buFont typeface="Arial" panose="020B0604020202020204" pitchFamily="34" charset="0"/>
-              <a:buChar char="•"/>
-            </a:pPr>
-            <a:r>
-              <a:rPr lang="en-US" altLang="zh-CN" sz="1600" dirty="0"/>
-              <a:t>Stop-profit price/Stop limit</a:t>
-            </a:r>
-          </a:p>
-          <a:p>
-            <a:pPr marL="1200150" lvl="2" indent="-285750">
-              <a:buFont typeface="Arial" panose="020B0604020202020204" pitchFamily="34" charset="0"/>
-              <a:buChar char="•"/>
-            </a:pPr>
-            <a:r>
-              <a:rPr lang="en-US" altLang="zh-CN" sz="1600" dirty="0"/>
-              <a:t>Commissions/stamp</a:t>
-            </a:r>
-          </a:p>
-          <a:p>
-            <a:pPr marL="742950" lvl="1" indent="-285750">
-              <a:buFont typeface="Arial" panose="020B0604020202020204" pitchFamily="34" charset="0"/>
-              <a:buChar char="•"/>
-            </a:pPr>
-            <a:r>
-              <a:rPr lang="en-US" altLang="zh-CN" dirty="0"/>
-              <a:t>User Asset</a:t>
-            </a:r>
-          </a:p>
-          <a:p>
-            <a:pPr marL="1200150" lvl="2" indent="-285750">
-              <a:buFont typeface="Arial" panose="020B0604020202020204" pitchFamily="34" charset="0"/>
-              <a:buChar char="•"/>
-            </a:pPr>
-            <a:r>
-              <a:rPr lang="en-US" altLang="zh-CN" sz="1600" dirty="0"/>
-              <a:t>Quantity</a:t>
-            </a:r>
-          </a:p>
-          <a:p>
-            <a:pPr marL="1200150" lvl="2" indent="-285750">
-              <a:buFont typeface="Arial" panose="020B0604020202020204" pitchFamily="34" charset="0"/>
-              <a:buChar char="•"/>
-            </a:pPr>
-            <a:r>
-              <a:rPr lang="en-US" altLang="zh-CN" sz="1600" dirty="0"/>
-              <a:t>Profit</a:t>
-            </a:r>
-          </a:p>
-          <a:p>
-            <a:pPr marL="742950" lvl="1" indent="-285750">
-              <a:buFont typeface="Arial" panose="020B0604020202020204" pitchFamily="34" charset="0"/>
-              <a:buChar char="•"/>
-            </a:pPr>
-            <a:r>
-              <a:rPr lang="en-US" altLang="zh-CN" dirty="0" err="1"/>
-              <a:t>RunSimulation</a:t>
-            </a:r>
-            <a:r>
-              <a:rPr lang="en-US" altLang="zh-CN" dirty="0"/>
-              <a:t>()/</a:t>
-            </a:r>
-            <a:r>
-              <a:rPr lang="en-US" altLang="zh-CN" dirty="0" err="1"/>
-              <a:t>RunRealTime</a:t>
-            </a:r>
-            <a:r>
-              <a:rPr lang="en-US" altLang="zh-CN" dirty="0"/>
-              <a:t>()</a:t>
-            </a:r>
-          </a:p>
-          <a:p>
-            <a:pPr marL="1200150" lvl="2" indent="-285750">
-              <a:buFont typeface="Arial" panose="020B0604020202020204" pitchFamily="34" charset="0"/>
-              <a:buChar char="•"/>
-            </a:pPr>
-            <a:r>
-              <a:rPr lang="en-US" altLang="zh-CN" dirty="0" err="1"/>
-              <a:t>MainLoop</a:t>
-            </a:r>
-            <a:r>
-              <a:rPr lang="en-US" altLang="zh-CN" dirty="0"/>
-              <a:t>(daily)</a:t>
-            </a:r>
-          </a:p>
-          <a:p>
-            <a:pPr marL="1657350" lvl="3" indent="-285750">
-              <a:buFont typeface="Arial" panose="020B0604020202020204" pitchFamily="34" charset="0"/>
-              <a:buChar char="•"/>
-            </a:pPr>
-            <a:r>
-              <a:rPr lang="en-US" altLang="zh-CN" dirty="0" err="1"/>
-              <a:t>TradeLoop</a:t>
-            </a:r>
-            <a:r>
-              <a:rPr lang="en-US" altLang="zh-CN" dirty="0"/>
-              <a:t>(</a:t>
-            </a:r>
-            <a:r>
-              <a:rPr lang="en-US" altLang="zh-CN" dirty="0" err="1"/>
-              <a:t>PerMinute</a:t>
-            </a:r>
-            <a:r>
-              <a:rPr lang="en-US" altLang="zh-CN" dirty="0"/>
-              <a:t>)</a:t>
-            </a:r>
-          </a:p>
-          <a:p>
-            <a:pPr marL="2114550" lvl="4" indent="-285750">
               <a:buFont typeface="Arial" panose="020B0604020202020204" pitchFamily="34" charset="0"/>
               <a:buChar char="•"/>
             </a:pPr>
@@ -7260,43 +7542,7 @@
             </a:r>
           </a:p>
           <a:p>
-            <a:pPr marL="2114550" lvl="4" indent="-285750">
-              <a:buFont typeface="Arial" panose="020B0604020202020204" pitchFamily="34" charset="0"/>
-              <a:buChar char="•"/>
-            </a:pPr>
-            <a:r>
-              <a:rPr lang="en-US" altLang="zh-CN" dirty="0" err="1"/>
-              <a:t>NewTrade</a:t>
-            </a:r>
-            <a:r>
-              <a:rPr lang="en-US" altLang="zh-CN" dirty="0"/>
-              <a:t>() if (</a:t>
-            </a:r>
-            <a:r>
-              <a:rPr lang="en-US" altLang="zh-CN" dirty="0" err="1"/>
-              <a:t>EntryPrice</a:t>
-            </a:r>
-            <a:r>
-              <a:rPr lang="en-US" altLang="zh-CN" dirty="0"/>
-              <a:t>)</a:t>
-            </a:r>
-          </a:p>
-          <a:p>
-            <a:pPr marL="2114550" lvl="4" indent="-285750">
-              <a:buFont typeface="Arial" panose="020B0604020202020204" pitchFamily="34" charset="0"/>
-              <a:buChar char="•"/>
-            </a:pPr>
-            <a:r>
-              <a:rPr lang="en-US" altLang="zh-CN" dirty="0" err="1"/>
-              <a:t>CheckAllTrade</a:t>
-            </a:r>
-            <a:r>
-              <a:rPr lang="en-US" altLang="zh-CN" dirty="0"/>
-              <a:t>()</a:t>
-            </a:r>
-          </a:p>
-          <a:p>
-            <a:pPr marL="2571750" lvl="5" indent="-285750">
+            <a:pPr marL="1200150" lvl="2" indent="-285750">
               <a:buFont typeface="Arial" panose="020B0604020202020204" pitchFamily="34" charset="0"/>
               <a:buChar char="•"/>
             </a:pPr>
@@ -7350,59 +7596,78 @@
             </a:r>
           </a:p>
           <a:p>
-            <a:pPr marL="2571750" lvl="5" indent="-285750">
+            <a:pPr marL="742950" lvl="1" indent="-285750">
               <a:buFont typeface="Arial" panose="020B0604020202020204" pitchFamily="34" charset="0"/>
               <a:buChar char="•"/>
             </a:pPr>
             <a:r>
-              <a:rPr lang="en-US" altLang="zh-CN" dirty="0" err="1"/>
-              <a:t>CloseTrade</a:t>
-            </a:r>
-            <a:r>
               <a:rPr lang="en-US" altLang="zh-CN" dirty="0"/>
-              <a:t>() if (Stop touch)</a:t>
-            </a:r>
-          </a:p>
-          <a:p>
-            <a:pPr marL="2114550" lvl="4" indent="-285750">
+              <a:t>Evaluation</a:t>
+            </a:r>
+          </a:p>
+          <a:p>
+            <a:pPr marL="1200150" lvl="2" indent="-285750">
               <a:buFont typeface="Arial" panose="020B0604020202020204" pitchFamily="34" charset="0"/>
               <a:buChar char="•"/>
             </a:pPr>
             <a:r>
               <a:rPr lang="en-US" altLang="zh-CN" dirty="0" err="1"/>
-              <a:t>CalculateUserAsset</a:t>
-            </a:r>
-            <a:r>
-              <a:rPr lang="en-US" altLang="zh-CN" dirty="0"/>
-              <a:t>()</a:t>
-            </a:r>
-          </a:p>
-          <a:p>
-            <a:pPr marL="685800" lvl="1" indent="-228600" defTabSz="914400">
-              <a:lnSpc>
-                <a:spcPct val="90000"/>
-              </a:lnSpc>
-              <a:spcBef>
-                <a:spcPts val="1000"/>
-              </a:spcBef>
+              <a:t>CostFunction</a:t>
+            </a:r>
+            <a:endParaRPr lang="en-US" altLang="zh-CN" dirty="0"/>
+          </a:p>
+          <a:p>
+            <a:pPr marL="1200150" lvl="2" indent="-285750">
               <a:buFont typeface="Arial" panose="020B0604020202020204" pitchFamily="34" charset="0"/>
               <a:buChar char="•"/>
-              <a:defRPr/>
             </a:pPr>
-            <a:endParaRPr lang="en-US" altLang="zh-CN" sz="3200" dirty="0">
-              <a:solidFill>
-                <a:prstClr val="black"/>
-              </a:solidFill>
-              <a:latin typeface="Calibri" panose="020F0502020204030204"/>
-              <a:ea typeface="等线" panose="02010600030101010101" pitchFamily="2" charset="-122"/>
-            </a:endParaRPr>
+            <a:r>
+              <a:rPr lang="en-US" altLang="zh-CN" dirty="0"/>
+              <a:t>Performance</a:t>
+            </a:r>
+          </a:p>
+          <a:p>
+            <a:pPr marL="1200150" lvl="2" indent="-285750">
+              <a:buFont typeface="Arial" panose="020B0604020202020204" pitchFamily="34" charset="0"/>
+              <a:buChar char="•"/>
+            </a:pPr>
+            <a:r>
+              <a:rPr lang="en-US" altLang="zh-CN" dirty="0"/>
+              <a:t>Evaluate()</a:t>
+            </a:r>
+          </a:p>
+          <a:p>
+            <a:pPr marL="742950" lvl="1" indent="-285750">
+              <a:buFont typeface="Arial" panose="020B0604020202020204" pitchFamily="34" charset="0"/>
+              <a:buChar char="•"/>
+            </a:pPr>
+            <a:r>
+              <a:rPr lang="en-US" altLang="zh-CN" dirty="0"/>
+              <a:t>Learning</a:t>
+            </a:r>
+          </a:p>
+          <a:p>
+            <a:pPr marL="1200150" lvl="2" indent="-285750">
+              <a:buFont typeface="Arial" panose="020B0604020202020204" pitchFamily="34" charset="0"/>
+              <a:buChar char="•"/>
+            </a:pPr>
+            <a:r>
+              <a:rPr lang="en-US" altLang="zh-CN" dirty="0">
+                <a:solidFill>
+                  <a:schemeClr val="bg1">
+                    <a:lumMod val="75000"/>
+                  </a:schemeClr>
+                </a:solidFill>
+              </a:rPr>
+              <a:t>Add machine learning module here</a:t>
+            </a:r>
           </a:p>
         </p:txBody>
       </p:sp>
     </p:spTree>
     <p:extLst>
       <p:ext uri="{BB962C8B-B14F-4D97-AF65-F5344CB8AC3E}">
-        <p14:creationId xmlns:p14="http://schemas.microsoft.com/office/powerpoint/2010/main" val="1563037589"/>
+        <p14:creationId xmlns:p14="http://schemas.microsoft.com/office/powerpoint/2010/main" val="4037334084"/>
       </p:ext>
     </p:extLst>
   </p:cSld>
@@ -7434,289 +7699,6 @@
           <p:cNvPr id="2" name="标题 1">
             <a:extLst>
               <a:ext uri="{FF2B5EF4-FFF2-40B4-BE49-F238E27FC236}">
-                <a16:creationId xmlns:a16="http://schemas.microsoft.com/office/drawing/2014/main" id="{F532A3AA-81D1-4278-BCDE-728827FF64A8}"/>
-              </a:ext>
-            </a:extLst>
-          </p:cNvPr>
-          <p:cNvSpPr>
-            <a:spLocks noGrp="1"/>
-          </p:cNvSpPr>
-          <p:nvPr>
-            <p:ph type="title"/>
-          </p:nvPr>
-        </p:nvSpPr>
-        <p:spPr/>
-        <p:txBody>
-          <a:bodyPr/>
-          <a:lstStyle/>
-          <a:p>
-            <a:r>
-              <a:rPr lang="en-US" altLang="zh-CN" dirty="0"/>
-              <a:t>Data structure</a:t>
-            </a:r>
-            <a:endParaRPr lang="zh-Hans-HK" altLang="en-US" dirty="0"/>
-          </a:p>
-        </p:txBody>
-      </p:sp>
-      <p:sp>
-        <p:nvSpPr>
-          <p:cNvPr id="5" name="文本框 4">
-            <a:extLst>
-              <a:ext uri="{FF2B5EF4-FFF2-40B4-BE49-F238E27FC236}">
-                <a16:creationId xmlns:a16="http://schemas.microsoft.com/office/drawing/2014/main" id="{3919AAC9-D388-4525-B1AD-BD82755F9FBC}"/>
-              </a:ext>
-            </a:extLst>
-          </p:cNvPr>
-          <p:cNvSpPr txBox="1"/>
-          <p:nvPr/>
-        </p:nvSpPr>
-        <p:spPr>
-          <a:xfrm>
-            <a:off x="7515361" y="2221708"/>
-            <a:ext cx="4881465" cy="3023905"/>
-          </a:xfrm>
-          <a:prstGeom prst="rect">
-            <a:avLst/>
-          </a:prstGeom>
-          <a:noFill/>
-        </p:spPr>
-        <p:txBody>
-          <a:bodyPr wrap="none" rtlCol="0">
-            <a:spAutoFit/>
-          </a:bodyPr>
-          <a:lstStyle/>
-          <a:p>
-            <a:pPr marL="285750" indent="-285750">
-              <a:buFont typeface="Arial" panose="020B0604020202020204" pitchFamily="34" charset="0"/>
-              <a:buChar char="•"/>
-            </a:pPr>
-            <a:r>
-              <a:rPr lang="en-US" altLang="zh-Hans-HK" dirty="0"/>
-              <a:t>Strategy(Learning)</a:t>
-            </a:r>
-          </a:p>
-          <a:p>
-            <a:pPr marL="742950" lvl="1" indent="-285750">
-              <a:buFont typeface="Arial" panose="020B0604020202020204" pitchFamily="34" charset="0"/>
-              <a:buChar char="•"/>
-            </a:pPr>
-            <a:r>
-              <a:rPr lang="en-US" altLang="zh-Hans-HK" dirty="0"/>
-              <a:t>Strategy</a:t>
-            </a:r>
-          </a:p>
-          <a:p>
-            <a:pPr marL="1200150" lvl="2" indent="-285750">
-              <a:buFont typeface="Arial" panose="020B0604020202020204" pitchFamily="34" charset="0"/>
-              <a:buChar char="•"/>
-            </a:pPr>
-            <a:r>
-              <a:rPr lang="en-US" altLang="zh-CN" dirty="0" err="1">
-                <a:highlight>
-                  <a:srgbClr val="FFFF00"/>
-                </a:highlight>
-              </a:rPr>
-              <a:t>GenerateEntryPrice</a:t>
-            </a:r>
-            <a:r>
-              <a:rPr lang="en-US" altLang="zh-CN" dirty="0">
-                <a:highlight>
-                  <a:srgbClr val="FFFF00"/>
-                </a:highlight>
-              </a:rPr>
-              <a:t>(</a:t>
-            </a:r>
-            <a:r>
-              <a:rPr lang="en-US" altLang="zh-CN" dirty="0" err="1">
-                <a:highlight>
-                  <a:srgbClr val="FFFF00"/>
-                </a:highlight>
-              </a:rPr>
-              <a:t>CurData</a:t>
-            </a:r>
-            <a:r>
-              <a:rPr lang="en-US" altLang="zh-CN" dirty="0">
-                <a:highlight>
-                  <a:srgbClr val="FFFF00"/>
-                </a:highlight>
-              </a:rPr>
-              <a:t>, </a:t>
-            </a:r>
-            <a:r>
-              <a:rPr lang="en-US" altLang="zh-CN" dirty="0" err="1">
-                <a:highlight>
-                  <a:srgbClr val="FFFF00"/>
-                </a:highlight>
-              </a:rPr>
-              <a:t>Stra</a:t>
-            </a:r>
-            <a:r>
-              <a:rPr lang="en-US" altLang="zh-CN" dirty="0">
-                <a:highlight>
-                  <a:srgbClr val="FFFF00"/>
-                </a:highlight>
-              </a:rPr>
-              <a:t>)</a:t>
-            </a:r>
-          </a:p>
-          <a:p>
-            <a:pPr marL="1200150" lvl="2" indent="-285750">
-              <a:buFont typeface="Arial" panose="020B0604020202020204" pitchFamily="34" charset="0"/>
-              <a:buChar char="•"/>
-            </a:pPr>
-            <a:r>
-              <a:rPr lang="en-US" altLang="zh-CN" dirty="0" err="1">
-                <a:highlight>
-                  <a:srgbClr val="FFFF00"/>
-                </a:highlight>
-              </a:rPr>
-              <a:t>ReNewAllTrade</a:t>
-            </a:r>
-            <a:r>
-              <a:rPr lang="en-US" altLang="zh-CN" dirty="0">
-                <a:highlight>
-                  <a:srgbClr val="FFFF00"/>
-                </a:highlight>
-              </a:rPr>
-              <a:t>(</a:t>
-            </a:r>
-            <a:r>
-              <a:rPr lang="en-US" altLang="zh-CN" dirty="0" err="1">
-                <a:highlight>
-                  <a:srgbClr val="FFFF00"/>
-                </a:highlight>
-              </a:rPr>
-              <a:t>CurData</a:t>
-            </a:r>
-            <a:r>
-              <a:rPr lang="en-US" altLang="zh-CN" dirty="0">
-                <a:highlight>
-                  <a:srgbClr val="FFFF00"/>
-                </a:highlight>
-              </a:rPr>
-              <a:t>, </a:t>
-            </a:r>
-            <a:r>
-              <a:rPr lang="en-US" altLang="zh-CN" dirty="0" err="1">
-                <a:highlight>
-                  <a:srgbClr val="FFFF00"/>
-                </a:highlight>
-              </a:rPr>
-              <a:t>Stra</a:t>
-            </a:r>
-            <a:r>
-              <a:rPr lang="en-US" altLang="zh-CN" dirty="0">
-                <a:highlight>
-                  <a:srgbClr val="FFFF00"/>
-                </a:highlight>
-              </a:rPr>
-              <a:t>)</a:t>
-            </a:r>
-          </a:p>
-          <a:p>
-            <a:pPr marL="742950" lvl="1" indent="-285750">
-              <a:buFont typeface="Arial" panose="020B0604020202020204" pitchFamily="34" charset="0"/>
-              <a:buChar char="•"/>
-            </a:pPr>
-            <a:r>
-              <a:rPr lang="en-US" altLang="zh-CN" dirty="0"/>
-              <a:t>Evaluation</a:t>
-            </a:r>
-          </a:p>
-          <a:p>
-            <a:pPr marL="1200150" lvl="2" indent="-285750">
-              <a:buFont typeface="Arial" panose="020B0604020202020204" pitchFamily="34" charset="0"/>
-              <a:buChar char="•"/>
-            </a:pPr>
-            <a:r>
-              <a:rPr lang="en-US" altLang="zh-CN" dirty="0" err="1"/>
-              <a:t>CostFunction</a:t>
-            </a:r>
-            <a:endParaRPr lang="en-US" altLang="zh-CN" dirty="0"/>
-          </a:p>
-          <a:p>
-            <a:pPr marL="1200150" lvl="2" indent="-285750">
-              <a:buFont typeface="Arial" panose="020B0604020202020204" pitchFamily="34" charset="0"/>
-              <a:buChar char="•"/>
-            </a:pPr>
-            <a:r>
-              <a:rPr lang="en-US" altLang="zh-CN" dirty="0"/>
-              <a:t>Performance</a:t>
-            </a:r>
-          </a:p>
-          <a:p>
-            <a:pPr marL="1200150" lvl="2" indent="-285750">
-              <a:buFont typeface="Arial" panose="020B0604020202020204" pitchFamily="34" charset="0"/>
-              <a:buChar char="•"/>
-            </a:pPr>
-            <a:r>
-              <a:rPr lang="en-US" altLang="zh-CN" dirty="0"/>
-              <a:t>Evaluate()</a:t>
-            </a:r>
-          </a:p>
-          <a:p>
-            <a:pPr marL="742950" lvl="1" indent="-285750">
-              <a:buFont typeface="Arial" panose="020B0604020202020204" pitchFamily="34" charset="0"/>
-              <a:buChar char="•"/>
-            </a:pPr>
-            <a:r>
-              <a:rPr lang="en-US" altLang="zh-CN" dirty="0"/>
-              <a:t>Learning</a:t>
-            </a:r>
-          </a:p>
-          <a:p>
-            <a:pPr marL="1200150" lvl="2" indent="-285750">
-              <a:buFont typeface="Arial" panose="020B0604020202020204" pitchFamily="34" charset="0"/>
-              <a:buChar char="•"/>
-            </a:pPr>
-            <a:r>
-              <a:rPr lang="en-US" altLang="zh-CN" dirty="0">
-                <a:solidFill>
-                  <a:schemeClr val="bg1">
-                    <a:lumMod val="75000"/>
-                  </a:schemeClr>
-                </a:solidFill>
-              </a:rPr>
-              <a:t>Add machine learning module here</a:t>
-            </a:r>
-          </a:p>
-        </p:txBody>
-      </p:sp>
-    </p:spTree>
-    <p:extLst>
-      <p:ext uri="{BB962C8B-B14F-4D97-AF65-F5344CB8AC3E}">
-        <p14:creationId xmlns:p14="http://schemas.microsoft.com/office/powerpoint/2010/main" val="4037334084"/>
-      </p:ext>
-    </p:extLst>
-  </p:cSld>
-  <p:clrMapOvr>
-    <a:masterClrMapping/>
-  </p:clrMapOvr>
-</p:sld>
-</file>
-
-<file path=ppt/slides/slide7.xml><?xml version="1.0" encoding="utf-8"?>
-<p:sld xmlns:a="http://schemas.openxmlformats.org/drawingml/2006/main" xmlns:r="http://schemas.openxmlformats.org/officeDocument/2006/relationships" xmlns:p="http://schemas.openxmlformats.org/presentationml/2006/main">
-  <p:cSld>
-    <p:spTree>
-      <p:nvGrpSpPr>
-        <p:cNvPr id="1" name=""/>
-        <p:cNvGrpSpPr/>
-        <p:nvPr/>
-      </p:nvGrpSpPr>
-      <p:grpSpPr>
-        <a:xfrm>
-          <a:off x="0" y="0"/>
-          <a:ext cx="0" cy="0"/>
-          <a:chOff x="0" y="0"/>
-          <a:chExt cx="0" cy="0"/>
-        </a:xfrm>
-      </p:grpSpPr>
-      <p:sp>
-        <p:nvSpPr>
-          <p:cNvPr id="2" name="标题 1">
-            <a:extLst>
-              <a:ext uri="{FF2B5EF4-FFF2-40B4-BE49-F238E27FC236}">
                 <a16:creationId xmlns:a16="http://schemas.microsoft.com/office/drawing/2014/main" id="{0ED4C7F3-B72A-4B22-899E-40CDFEF6D3FB}"/>
               </a:ext>
             </a:extLst>
@@ -7770,6 +7752,9 @@
               <a:rPr lang="en-US" altLang="zh-Hans-HK" dirty="0" err="1"/>
               <a:t>FutuOpenAPI</a:t>
             </a:r>
+            <a:endParaRPr lang="en-US" altLang="zh-Hans-HK" dirty="0"/>
+          </a:p>
+          <a:p>
             <a:endParaRPr lang="zh-Hans-HK" altLang="en-US" dirty="0"/>
           </a:p>
         </p:txBody>
@@ -7787,7 +7772,7 @@
 </p:sld>
 </file>
 
-<file path=ppt/slides/slide8.xml><?xml version="1.0" encoding="utf-8"?>
+<file path=ppt/slides/slide7.xml><?xml version="1.0" encoding="utf-8"?>
 <p:sld xmlns:a="http://schemas.openxmlformats.org/drawingml/2006/main" xmlns:r="http://schemas.openxmlformats.org/officeDocument/2006/relationships" xmlns:p="http://schemas.openxmlformats.org/presentationml/2006/main">
   <p:cSld>
     <p:spTree>

</xml_diff>